<commit_message>
long time no push
</commit_message>
<xml_diff>
--- a/docs/工具使用篇/绘图截图/PPT/工作总结.pptx
+++ b/docs/工具使用篇/绘图截图/PPT/工作总结.pptx
@@ -250,7 +250,7 @@
           <a:p>
             <a:fld id="{B3061A59-E211-45AA-A9F0-2CB5442E46EC}" type="datetimeFigureOut">
               <a:rPr lang="zh-CN" altLang="en-US" smtClean="0"/>
-              <a:t>2021/10/26</a:t>
+              <a:t>2021/11/18</a:t>
             </a:fld>
             <a:endParaRPr lang="zh-CN" altLang="en-US"/>
           </a:p>
@@ -2242,7 +2242,7 @@
           <a:p>
             <a:fld id="{82F288E0-7875-42C4-84C8-98DBBD3BF4D2}" type="datetimeFigureOut">
               <a:rPr lang="zh-CN" altLang="en-US" smtClean="0"/>
-              <a:t>2021/10/26</a:t>
+              <a:t>2021/11/18</a:t>
             </a:fld>
             <a:endParaRPr lang="zh-CN" altLang="en-US"/>
           </a:p>
@@ -2400,7 +2400,7 @@
           <a:p>
             <a:fld id="{82F288E0-7875-42C4-84C8-98DBBD3BF4D2}" type="datetimeFigureOut">
               <a:rPr lang="zh-CN" altLang="en-US" smtClean="0"/>
-              <a:t>2021/10/26</a:t>
+              <a:t>2021/11/18</a:t>
             </a:fld>
             <a:endParaRPr lang="zh-CN" altLang="en-US"/>
           </a:p>
@@ -2575,7 +2575,7 @@
           <a:p>
             <a:fld id="{82F288E0-7875-42C4-84C8-98DBBD3BF4D2}" type="datetimeFigureOut">
               <a:rPr lang="zh-CN" altLang="en-US" smtClean="0"/>
-              <a:t>2021/10/26</a:t>
+              <a:t>2021/11/18</a:t>
             </a:fld>
             <a:endParaRPr lang="zh-CN" altLang="en-US"/>
           </a:p>
@@ -2827,7 +2827,7 @@
           <a:p>
             <a:fld id="{82F288E0-7875-42C4-84C8-98DBBD3BF4D2}" type="datetimeFigureOut">
               <a:rPr lang="zh-CN" altLang="en-US" smtClean="0"/>
-              <a:t>2021/10/26</a:t>
+              <a:t>2021/11/18</a:t>
             </a:fld>
             <a:endParaRPr lang="zh-CN" altLang="en-US"/>
           </a:p>
@@ -3063,7 +3063,7 @@
           <a:p>
             <a:fld id="{82F288E0-7875-42C4-84C8-98DBBD3BF4D2}" type="datetimeFigureOut">
               <a:rPr lang="zh-CN" altLang="en-US" smtClean="0"/>
-              <a:t>2021/10/26</a:t>
+              <a:t>2021/11/18</a:t>
             </a:fld>
             <a:endParaRPr lang="zh-CN" altLang="en-US"/>
           </a:p>
@@ -3434,7 +3434,7 @@
           <a:p>
             <a:fld id="{82F288E0-7875-42C4-84C8-98DBBD3BF4D2}" type="datetimeFigureOut">
               <a:rPr lang="zh-CN" altLang="en-US" smtClean="0"/>
-              <a:t>2021/10/26</a:t>
+              <a:t>2021/11/18</a:t>
             </a:fld>
             <a:endParaRPr lang="zh-CN" altLang="en-US"/>
           </a:p>
@@ -3558,7 +3558,7 @@
           <a:p>
             <a:fld id="{82F288E0-7875-42C4-84C8-98DBBD3BF4D2}" type="datetimeFigureOut">
               <a:rPr lang="zh-CN" altLang="en-US" smtClean="0"/>
-              <a:t>2021/10/26</a:t>
+              <a:t>2021/11/18</a:t>
             </a:fld>
             <a:endParaRPr lang="zh-CN" altLang="en-US"/>
           </a:p>
@@ -3685,7 +3685,7 @@
           <a:p>
             <a:fld id="{82F288E0-7875-42C4-84C8-98DBBD3BF4D2}" type="datetimeFigureOut">
               <a:rPr lang="zh-CN" altLang="en-US" smtClean="0"/>
-              <a:t>2021/10/26</a:t>
+              <a:t>2021/11/18</a:t>
             </a:fld>
             <a:endParaRPr lang="zh-CN" altLang="en-US"/>
           </a:p>
@@ -3969,7 +3969,7 @@
           <a:p>
             <a:fld id="{82F288E0-7875-42C4-84C8-98DBBD3BF4D2}" type="datetimeFigureOut">
               <a:rPr lang="zh-CN" altLang="en-US" smtClean="0"/>
-              <a:t>2021/10/26</a:t>
+              <a:t>2021/11/18</a:t>
             </a:fld>
             <a:endParaRPr lang="zh-CN" altLang="en-US"/>
           </a:p>
@@ -4154,7 +4154,7 @@
           <a:p>
             <a:fld id="{82F288E0-7875-42C4-84C8-98DBBD3BF4D2}" type="datetimeFigureOut">
               <a:rPr lang="zh-CN" altLang="en-US" smtClean="0"/>
-              <a:t>2021/10/26</a:t>
+              <a:t>2021/11/18</a:t>
             </a:fld>
             <a:endParaRPr lang="zh-CN" altLang="en-US"/>
           </a:p>
@@ -4372,7 +4372,7 @@
           <a:p>
             <a:fld id="{82F288E0-7875-42C4-84C8-98DBBD3BF4D2}" type="datetimeFigureOut">
               <a:rPr lang="zh-CN" altLang="en-US" smtClean="0"/>
-              <a:t>2021/10/26</a:t>
+              <a:t>2021/11/18</a:t>
             </a:fld>
             <a:endParaRPr lang="zh-CN" altLang="en-US"/>
           </a:p>
@@ -33045,7 +33045,7 @@
         </p:nvGrpSpPr>
         <p:grpSpPr>
           <a:xfrm>
-            <a:off x="1344018" y="1700530"/>
+            <a:off x="1328455" y="1352233"/>
             <a:ext cx="2952680" cy="1741805"/>
             <a:chOff x="11804" y="3191"/>
             <a:chExt cx="3195" cy="2743"/>
@@ -33547,10 +33547,10 @@
         </p:nvGrpSpPr>
         <p:grpSpPr>
           <a:xfrm>
-            <a:off x="5935747" y="1661695"/>
-            <a:ext cx="2900004" cy="1424940"/>
-            <a:chOff x="11881" y="3070"/>
-            <a:chExt cx="3138" cy="2244"/>
+            <a:off x="5938522" y="1416585"/>
+            <a:ext cx="2977634" cy="1404620"/>
+            <a:chOff x="11884" y="2684"/>
+            <a:chExt cx="3222" cy="2212"/>
           </a:xfrm>
         </p:grpSpPr>
         <p:sp>
@@ -33561,7 +33561,7 @@
           </p:nvSpPr>
           <p:spPr>
             <a:xfrm>
-              <a:off x="11884" y="3744"/>
+              <a:off x="11971" y="3326"/>
               <a:ext cx="3135" cy="1570"/>
             </a:xfrm>
             <a:prstGeom prst="rect">
@@ -33701,7 +33701,7 @@
           </p:nvSpPr>
           <p:spPr>
             <a:xfrm>
-              <a:off x="11881" y="3070"/>
+              <a:off x="11884" y="2684"/>
               <a:ext cx="3021" cy="628"/>
             </a:xfrm>
             <a:prstGeom prst="rect">

</xml_diff>